<commit_message>
Added architecture in Review Sprints
</commit_message>
<xml_diff>
--- a/Documents/Review Sprints - Open Game.pptx
+++ b/Documents/Review Sprints - Open Game.pptx
@@ -5,31 +5,32 @@
     <p:sldMasterId id="2147483667" r:id="rId1"/>
   </p:sldMasterIdLst>
   <p:notesMasterIdLst>
-    <p:notesMasterId r:id="rId7"/>
+    <p:notesMasterId r:id="rId8"/>
   </p:notesMasterIdLst>
   <p:sldIdLst>
     <p:sldId id="256" r:id="rId2"/>
     <p:sldId id="257" r:id="rId3"/>
-    <p:sldId id="278" r:id="rId4"/>
-    <p:sldId id="262" r:id="rId5"/>
-    <p:sldId id="277" r:id="rId6"/>
+    <p:sldId id="279" r:id="rId4"/>
+    <p:sldId id="278" r:id="rId5"/>
+    <p:sldId id="262" r:id="rId6"/>
+    <p:sldId id="277" r:id="rId7"/>
   </p:sldIdLst>
   <p:sldSz cx="12192000" cy="6858000"/>
   <p:notesSz cx="7023100" cy="9309100"/>
   <p:embeddedFontLst>
     <p:embeddedFont>
       <p:font typeface="Calibri" panose="020F0502020204030204" pitchFamily="34" charset="0"/>
-      <p:regular r:id="rId8"/>
-      <p:bold r:id="rId9"/>
-      <p:italic r:id="rId10"/>
-      <p:boldItalic r:id="rId11"/>
+      <p:regular r:id="rId9"/>
+      <p:bold r:id="rId10"/>
+      <p:italic r:id="rId11"/>
+      <p:boldItalic r:id="rId12"/>
     </p:embeddedFont>
     <p:embeddedFont>
       <p:font typeface="Century Gothic" panose="020B0502020202020204" pitchFamily="34" charset="0"/>
-      <p:regular r:id="rId12"/>
-      <p:bold r:id="rId13"/>
-      <p:italic r:id="rId14"/>
-      <p:boldItalic r:id="rId15"/>
+      <p:regular r:id="rId13"/>
+      <p:bold r:id="rId14"/>
+      <p:italic r:id="rId15"/>
+      <p:boldItalic r:id="rId16"/>
     </p:embeddedFont>
   </p:embeddedFontLst>
   <p:defaultTextStyle>
@@ -1943,7 +1944,7 @@
             </a:pPr>
             <a:fld id="{00000000-1234-1234-1234-123412341234}" type="slidenum">
               <a:rPr lang="pt-BR"/>
-              <a:t>3</a:t>
+              <a:t>4</a:t>
             </a:fld>
             <a:endParaRPr/>
           </a:p>
@@ -2112,7 +2113,7 @@
             </a:pPr>
             <a:fld id="{00000000-1234-1234-1234-123412341234}" type="slidenum">
               <a:rPr lang="pt-BR"/>
-              <a:t>4</a:t>
+              <a:t>5</a:t>
             </a:fld>
             <a:endParaRPr/>
           </a:p>
@@ -2276,7 +2277,7 @@
             </a:pPr>
             <a:fld id="{00000000-1234-1234-1234-123412341234}" type="slidenum">
               <a:rPr lang="pt-BR"/>
-              <a:t>5</a:t>
+              <a:t>6</a:t>
             </a:fld>
             <a:endParaRPr/>
           </a:p>
@@ -25678,6 +25679,621 @@
   <p:cSld>
     <p:spTree>
       <p:nvGrpSpPr>
+        <p:cNvPr id="1" name=""/>
+        <p:cNvGrpSpPr/>
+        <p:nvPr/>
+      </p:nvGrpSpPr>
+      <p:grpSpPr>
+        <a:xfrm>
+          <a:off x="0" y="0"/>
+          <a:ext cx="0" cy="0"/>
+          <a:chOff x="0" y="0"/>
+          <a:chExt cx="0" cy="0"/>
+        </a:xfrm>
+      </p:grpSpPr>
+      <p:sp>
+        <p:nvSpPr>
+          <p:cNvPr id="22" name="Elipse 21">
+            <a:extLst>
+              <a:ext uri="{FF2B5EF4-FFF2-40B4-BE49-F238E27FC236}">
+                <a16:creationId xmlns:a16="http://schemas.microsoft.com/office/drawing/2014/main" id="{914F6EE1-ABC5-4CF6-83D0-DE0F94189A9A}"/>
+              </a:ext>
+            </a:extLst>
+          </p:cNvPr>
+          <p:cNvSpPr/>
+          <p:nvPr/>
+        </p:nvSpPr>
+        <p:spPr>
+          <a:xfrm>
+            <a:off x="7025127" y="1387496"/>
+            <a:ext cx="4132181" cy="4075965"/>
+          </a:xfrm>
+          <a:prstGeom prst="ellipse">
+            <a:avLst/>
+          </a:prstGeom>
+          <a:solidFill>
+            <a:schemeClr val="accent5">
+              <a:lumMod val="40000"/>
+              <a:lumOff val="60000"/>
+            </a:schemeClr>
+          </a:solidFill>
+        </p:spPr>
+        <p:style>
+          <a:lnRef idx="2">
+            <a:schemeClr val="accent1">
+              <a:shade val="50000"/>
+            </a:schemeClr>
+          </a:lnRef>
+          <a:fillRef idx="1">
+            <a:schemeClr val="accent1"/>
+          </a:fillRef>
+          <a:effectRef idx="0">
+            <a:schemeClr val="accent1"/>
+          </a:effectRef>
+          <a:fontRef idx="minor">
+            <a:schemeClr val="lt1"/>
+          </a:fontRef>
+        </p:style>
+        <p:txBody>
+          <a:bodyPr rtlCol="0" anchor="ctr"/>
+          <a:lstStyle/>
+          <a:p>
+            <a:pPr algn="ctr"/>
+            <a:endParaRPr lang="en-US"/>
+          </a:p>
+        </p:txBody>
+      </p:sp>
+      <p:sp>
+        <p:nvSpPr>
+          <p:cNvPr id="2" name="Título 1">
+            <a:extLst>
+              <a:ext uri="{FF2B5EF4-FFF2-40B4-BE49-F238E27FC236}">
+                <a16:creationId xmlns:a16="http://schemas.microsoft.com/office/drawing/2014/main" id="{B4A30E7A-1BF3-4EB6-9B32-ED78B9978738}"/>
+              </a:ext>
+            </a:extLst>
+          </p:cNvPr>
+          <p:cNvSpPr>
+            <a:spLocks noGrp="1"/>
+          </p:cNvSpPr>
+          <p:nvPr>
+            <p:ph type="title"/>
+          </p:nvPr>
+        </p:nvSpPr>
+        <p:spPr/>
+        <p:txBody>
+          <a:bodyPr/>
+          <a:lstStyle/>
+          <a:p>
+            <a:r>
+              <a:rPr lang="pt-BR" dirty="0"/>
+              <a:t>Arquitetura</a:t>
+            </a:r>
+            <a:endParaRPr lang="en-US" dirty="0"/>
+          </a:p>
+        </p:txBody>
+      </p:sp>
+      <p:pic>
+        <p:nvPicPr>
+          <p:cNvPr id="8" name="Imagem 7">
+            <a:extLst>
+              <a:ext uri="{FF2B5EF4-FFF2-40B4-BE49-F238E27FC236}">
+                <a16:creationId xmlns:a16="http://schemas.microsoft.com/office/drawing/2014/main" id="{8B443AD0-7452-4AFB-A821-CCFD8926A478}"/>
+              </a:ext>
+            </a:extLst>
+          </p:cNvPr>
+          <p:cNvPicPr>
+            <a:picLocks noChangeAspect="1"/>
+          </p:cNvPicPr>
+          <p:nvPr/>
+        </p:nvPicPr>
+        <p:blipFill>
+          <a:blip r:embed="rId2"/>
+          <a:stretch>
+            <a:fillRect/>
+          </a:stretch>
+        </p:blipFill>
+        <p:spPr>
+          <a:xfrm>
+            <a:off x="4171661" y="2957964"/>
+            <a:ext cx="1109779" cy="1659089"/>
+          </a:xfrm>
+          <a:prstGeom prst="rect">
+            <a:avLst/>
+          </a:prstGeom>
+        </p:spPr>
+      </p:pic>
+      <p:sp>
+        <p:nvSpPr>
+          <p:cNvPr id="9" name="CaixaDeTexto 8">
+            <a:extLst>
+              <a:ext uri="{FF2B5EF4-FFF2-40B4-BE49-F238E27FC236}">
+                <a16:creationId xmlns:a16="http://schemas.microsoft.com/office/drawing/2014/main" id="{52D61E69-45C7-4D59-958D-BDC694FBCAC8}"/>
+              </a:ext>
+            </a:extLst>
+          </p:cNvPr>
+          <p:cNvSpPr txBox="1"/>
+          <p:nvPr/>
+        </p:nvSpPr>
+        <p:spPr>
+          <a:xfrm>
+            <a:off x="761234" y="2499612"/>
+            <a:ext cx="1789272" cy="369332"/>
+          </a:xfrm>
+          <a:prstGeom prst="rect">
+            <a:avLst/>
+          </a:prstGeom>
+          <a:noFill/>
+        </p:spPr>
+        <p:txBody>
+          <a:bodyPr wrap="none" rtlCol="0">
+            <a:spAutoFit/>
+          </a:bodyPr>
+          <a:lstStyle/>
+          <a:p>
+            <a:r>
+              <a:rPr lang="pt-BR" dirty="0"/>
+              <a:t>Google Cloud</a:t>
+            </a:r>
+            <a:endParaRPr lang="en-US" dirty="0"/>
+          </a:p>
+        </p:txBody>
+      </p:sp>
+      <p:pic>
+        <p:nvPicPr>
+          <p:cNvPr id="11" name="Imagem 10">
+            <a:extLst>
+              <a:ext uri="{FF2B5EF4-FFF2-40B4-BE49-F238E27FC236}">
+                <a16:creationId xmlns:a16="http://schemas.microsoft.com/office/drawing/2014/main" id="{44628BE0-A15E-410E-B0F7-BD772F0B4277}"/>
+              </a:ext>
+            </a:extLst>
+          </p:cNvPr>
+          <p:cNvPicPr>
+            <a:picLocks noChangeAspect="1"/>
+          </p:cNvPicPr>
+          <p:nvPr/>
+        </p:nvPicPr>
+        <p:blipFill>
+          <a:blip r:embed="rId3"/>
+          <a:stretch>
+            <a:fillRect/>
+          </a:stretch>
+        </p:blipFill>
+        <p:spPr>
+          <a:xfrm>
+            <a:off x="8354832" y="1732880"/>
+            <a:ext cx="1400530" cy="1400530"/>
+          </a:xfrm>
+          <a:prstGeom prst="rect">
+            <a:avLst/>
+          </a:prstGeom>
+        </p:spPr>
+      </p:pic>
+      <p:pic>
+        <p:nvPicPr>
+          <p:cNvPr id="6" name="Imagem 5">
+            <a:extLst>
+              <a:ext uri="{FF2B5EF4-FFF2-40B4-BE49-F238E27FC236}">
+                <a16:creationId xmlns:a16="http://schemas.microsoft.com/office/drawing/2014/main" id="{A8D87965-76C1-4D31-83EF-A7C9D168614C}"/>
+              </a:ext>
+            </a:extLst>
+          </p:cNvPr>
+          <p:cNvPicPr>
+            <a:picLocks noChangeAspect="1"/>
+          </p:cNvPicPr>
+          <p:nvPr/>
+        </p:nvPicPr>
+        <p:blipFill>
+          <a:blip r:embed="rId4"/>
+          <a:stretch>
+            <a:fillRect/>
+          </a:stretch>
+        </p:blipFill>
+        <p:spPr>
+          <a:xfrm>
+            <a:off x="696488" y="2801727"/>
+            <a:ext cx="1951291" cy="1799203"/>
+          </a:xfrm>
+          <a:prstGeom prst="rect">
+            <a:avLst/>
+          </a:prstGeom>
+        </p:spPr>
+      </p:pic>
+      <p:pic>
+        <p:nvPicPr>
+          <p:cNvPr id="15" name="Imagem 14">
+            <a:extLst>
+              <a:ext uri="{FF2B5EF4-FFF2-40B4-BE49-F238E27FC236}">
+                <a16:creationId xmlns:a16="http://schemas.microsoft.com/office/drawing/2014/main" id="{565CC32D-0A8D-484C-9585-5333714A3BC7}"/>
+              </a:ext>
+            </a:extLst>
+          </p:cNvPr>
+          <p:cNvPicPr>
+            <a:picLocks noChangeAspect="1"/>
+          </p:cNvPicPr>
+          <p:nvPr/>
+        </p:nvPicPr>
+        <p:blipFill>
+          <a:blip r:embed="rId5"/>
+          <a:stretch>
+            <a:fillRect/>
+          </a:stretch>
+        </p:blipFill>
+        <p:spPr>
+          <a:xfrm>
+            <a:off x="7102342" y="4301064"/>
+            <a:ext cx="1292341" cy="1282736"/>
+          </a:xfrm>
+          <a:prstGeom prst="rect">
+            <a:avLst/>
+          </a:prstGeom>
+        </p:spPr>
+      </p:pic>
+      <p:sp>
+        <p:nvSpPr>
+          <p:cNvPr id="18" name="CaixaDeTexto 17">
+            <a:extLst>
+              <a:ext uri="{FF2B5EF4-FFF2-40B4-BE49-F238E27FC236}">
+                <a16:creationId xmlns:a16="http://schemas.microsoft.com/office/drawing/2014/main" id="{CDFEA352-4C2E-4569-9E1B-0D025A85C1E9}"/>
+              </a:ext>
+            </a:extLst>
+          </p:cNvPr>
+          <p:cNvSpPr txBox="1"/>
+          <p:nvPr/>
+        </p:nvSpPr>
+        <p:spPr>
+          <a:xfrm>
+            <a:off x="7102341" y="5419394"/>
+            <a:ext cx="1292341" cy="369332"/>
+          </a:xfrm>
+          <a:prstGeom prst="rect">
+            <a:avLst/>
+          </a:prstGeom>
+          <a:noFill/>
+        </p:spPr>
+        <p:txBody>
+          <a:bodyPr wrap="none" rtlCol="0">
+            <a:spAutoFit/>
+          </a:bodyPr>
+          <a:lstStyle/>
+          <a:p>
+            <a:r>
+              <a:rPr lang="pt-BR" dirty="0" err="1"/>
+              <a:t>AngularJS</a:t>
+            </a:r>
+            <a:endParaRPr lang="en-US" dirty="0"/>
+          </a:p>
+        </p:txBody>
+      </p:sp>
+      <p:sp>
+        <p:nvSpPr>
+          <p:cNvPr id="19" name="CaixaDeTexto 18">
+            <a:extLst>
+              <a:ext uri="{FF2B5EF4-FFF2-40B4-BE49-F238E27FC236}">
+                <a16:creationId xmlns:a16="http://schemas.microsoft.com/office/drawing/2014/main" id="{483DA1FF-A274-48C7-9DFA-506F1BBA8296}"/>
+              </a:ext>
+            </a:extLst>
+          </p:cNvPr>
+          <p:cNvSpPr txBox="1"/>
+          <p:nvPr/>
+        </p:nvSpPr>
+        <p:spPr>
+          <a:xfrm>
+            <a:off x="9200258" y="5627925"/>
+            <a:ext cx="1249060" cy="369332"/>
+          </a:xfrm>
+          <a:prstGeom prst="rect">
+            <a:avLst/>
+          </a:prstGeom>
+          <a:noFill/>
+        </p:spPr>
+        <p:txBody>
+          <a:bodyPr wrap="none" rtlCol="0">
+            <a:spAutoFit/>
+          </a:bodyPr>
+          <a:lstStyle/>
+          <a:p>
+            <a:r>
+              <a:rPr lang="pt-BR" dirty="0" err="1"/>
+              <a:t>Bootstrap</a:t>
+            </a:r>
+            <a:endParaRPr lang="en-US" dirty="0"/>
+          </a:p>
+        </p:txBody>
+      </p:sp>
+      <p:pic>
+        <p:nvPicPr>
+          <p:cNvPr id="17" name="Imagem 16">
+            <a:extLst>
+              <a:ext uri="{FF2B5EF4-FFF2-40B4-BE49-F238E27FC236}">
+                <a16:creationId xmlns:a16="http://schemas.microsoft.com/office/drawing/2014/main" id="{C874928D-1288-4A78-9D37-6C25547CF327}"/>
+              </a:ext>
+            </a:extLst>
+          </p:cNvPr>
+          <p:cNvPicPr>
+            <a:picLocks noChangeAspect="1"/>
+          </p:cNvPicPr>
+          <p:nvPr/>
+        </p:nvPicPr>
+        <p:blipFill>
+          <a:blip r:embed="rId6"/>
+          <a:stretch>
+            <a:fillRect/>
+          </a:stretch>
+        </p:blipFill>
+        <p:spPr>
+          <a:xfrm>
+            <a:off x="7981025" y="4508564"/>
+            <a:ext cx="3687526" cy="1400530"/>
+          </a:xfrm>
+          <a:prstGeom prst="rect">
+            <a:avLst/>
+          </a:prstGeom>
+        </p:spPr>
+      </p:pic>
+      <p:pic>
+        <p:nvPicPr>
+          <p:cNvPr id="24" name="Imagem 23">
+            <a:extLst>
+              <a:ext uri="{FF2B5EF4-FFF2-40B4-BE49-F238E27FC236}">
+                <a16:creationId xmlns:a16="http://schemas.microsoft.com/office/drawing/2014/main" id="{943F40D2-584A-4CEE-B775-BBD5E25A6B6A}"/>
+              </a:ext>
+            </a:extLst>
+          </p:cNvPr>
+          <p:cNvPicPr>
+            <a:picLocks noChangeAspect="1"/>
+          </p:cNvPicPr>
+          <p:nvPr/>
+        </p:nvPicPr>
+        <p:blipFill>
+          <a:blip r:embed="rId7"/>
+          <a:stretch>
+            <a:fillRect/>
+          </a:stretch>
+        </p:blipFill>
+        <p:spPr>
+          <a:xfrm>
+            <a:off x="6895607" y="1377205"/>
+            <a:ext cx="1174761" cy="1174761"/>
+          </a:xfrm>
+          <a:prstGeom prst="rect">
+            <a:avLst/>
+          </a:prstGeom>
+        </p:spPr>
+      </p:pic>
+      <p:sp>
+        <p:nvSpPr>
+          <p:cNvPr id="25" name="CaixaDeTexto 24">
+            <a:extLst>
+              <a:ext uri="{FF2B5EF4-FFF2-40B4-BE49-F238E27FC236}">
+                <a16:creationId xmlns:a16="http://schemas.microsoft.com/office/drawing/2014/main" id="{10D89059-415C-48B5-880F-853171D7E916}"/>
+              </a:ext>
+            </a:extLst>
+          </p:cNvPr>
+          <p:cNvSpPr txBox="1"/>
+          <p:nvPr/>
+        </p:nvSpPr>
+        <p:spPr>
+          <a:xfrm>
+            <a:off x="6963003" y="1152983"/>
+            <a:ext cx="915635" cy="369332"/>
+          </a:xfrm>
+          <a:prstGeom prst="rect">
+            <a:avLst/>
+          </a:prstGeom>
+          <a:noFill/>
+        </p:spPr>
+        <p:txBody>
+          <a:bodyPr wrap="none" rtlCol="0">
+            <a:spAutoFit/>
+          </a:bodyPr>
+          <a:lstStyle/>
+          <a:p>
+            <a:r>
+              <a:rPr lang="pt-BR" dirty="0" err="1"/>
+              <a:t>jQuery</a:t>
+            </a:r>
+            <a:endParaRPr lang="en-US" dirty="0"/>
+          </a:p>
+        </p:txBody>
+      </p:sp>
+      <p:pic>
+        <p:nvPicPr>
+          <p:cNvPr id="27" name="Imagem 26">
+            <a:extLst>
+              <a:ext uri="{FF2B5EF4-FFF2-40B4-BE49-F238E27FC236}">
+                <a16:creationId xmlns:a16="http://schemas.microsoft.com/office/drawing/2014/main" id="{48B32617-4B86-4631-A0BB-8D6A1AE149A9}"/>
+              </a:ext>
+            </a:extLst>
+          </p:cNvPr>
+          <p:cNvPicPr>
+            <a:picLocks noChangeAspect="1"/>
+          </p:cNvPicPr>
+          <p:nvPr/>
+        </p:nvPicPr>
+        <p:blipFill>
+          <a:blip r:embed="rId8"/>
+          <a:stretch>
+            <a:fillRect/>
+          </a:stretch>
+        </p:blipFill>
+        <p:spPr>
+          <a:xfrm>
+            <a:off x="9847692" y="3103314"/>
+            <a:ext cx="872064" cy="872064"/>
+          </a:xfrm>
+          <a:prstGeom prst="rect">
+            <a:avLst/>
+          </a:prstGeom>
+        </p:spPr>
+      </p:pic>
+      <p:pic>
+        <p:nvPicPr>
+          <p:cNvPr id="29" name="Imagem 28">
+            <a:extLst>
+              <a:ext uri="{FF2B5EF4-FFF2-40B4-BE49-F238E27FC236}">
+                <a16:creationId xmlns:a16="http://schemas.microsoft.com/office/drawing/2014/main" id="{5D48A242-8EA9-4A72-A0AB-517A9D2F209E}"/>
+              </a:ext>
+            </a:extLst>
+          </p:cNvPr>
+          <p:cNvPicPr>
+            <a:picLocks noChangeAspect="1"/>
+          </p:cNvPicPr>
+          <p:nvPr/>
+        </p:nvPicPr>
+        <p:blipFill>
+          <a:blip r:embed="rId9"/>
+          <a:stretch>
+            <a:fillRect/>
+          </a:stretch>
+        </p:blipFill>
+        <p:spPr>
+          <a:xfrm>
+            <a:off x="7778427" y="3245971"/>
+            <a:ext cx="1083076" cy="1083076"/>
+          </a:xfrm>
+          <a:prstGeom prst="rect">
+            <a:avLst/>
+          </a:prstGeom>
+        </p:spPr>
+      </p:pic>
+      <p:pic>
+        <p:nvPicPr>
+          <p:cNvPr id="31" name="Imagem 30">
+            <a:extLst>
+              <a:ext uri="{FF2B5EF4-FFF2-40B4-BE49-F238E27FC236}">
+                <a16:creationId xmlns:a16="http://schemas.microsoft.com/office/drawing/2014/main" id="{2B398863-454A-4FFE-B256-64511DCA5454}"/>
+              </a:ext>
+            </a:extLst>
+          </p:cNvPr>
+          <p:cNvPicPr>
+            <a:picLocks noChangeAspect="1"/>
+          </p:cNvPicPr>
+          <p:nvPr/>
+        </p:nvPicPr>
+        <p:blipFill>
+          <a:blip r:embed="rId10"/>
+          <a:stretch>
+            <a:fillRect/>
+          </a:stretch>
+        </p:blipFill>
+        <p:spPr>
+          <a:xfrm rot="13173704">
+            <a:off x="5260307" y="2597159"/>
+            <a:ext cx="1615490" cy="1292390"/>
+          </a:xfrm>
+          <a:prstGeom prst="rect">
+            <a:avLst/>
+          </a:prstGeom>
+        </p:spPr>
+      </p:pic>
+      <p:pic>
+        <p:nvPicPr>
+          <p:cNvPr id="32" name="Imagem 31">
+            <a:extLst>
+              <a:ext uri="{FF2B5EF4-FFF2-40B4-BE49-F238E27FC236}">
+                <a16:creationId xmlns:a16="http://schemas.microsoft.com/office/drawing/2014/main" id="{D91A8F36-AEF1-4E4D-8E72-FE4D95089580}"/>
+              </a:ext>
+            </a:extLst>
+          </p:cNvPr>
+          <p:cNvPicPr>
+            <a:picLocks noChangeAspect="1"/>
+          </p:cNvPicPr>
+          <p:nvPr/>
+        </p:nvPicPr>
+        <p:blipFill>
+          <a:blip r:embed="rId10"/>
+          <a:stretch>
+            <a:fillRect/>
+          </a:stretch>
+        </p:blipFill>
+        <p:spPr>
+          <a:xfrm rot="13173704">
+            <a:off x="2504967" y="2551506"/>
+            <a:ext cx="1593148" cy="1274517"/>
+          </a:xfrm>
+          <a:prstGeom prst="rect">
+            <a:avLst/>
+          </a:prstGeom>
+        </p:spPr>
+      </p:pic>
+      <p:pic>
+        <p:nvPicPr>
+          <p:cNvPr id="33" name="Imagem 32">
+            <a:extLst>
+              <a:ext uri="{FF2B5EF4-FFF2-40B4-BE49-F238E27FC236}">
+                <a16:creationId xmlns:a16="http://schemas.microsoft.com/office/drawing/2014/main" id="{EFE2E189-E306-4F78-BED2-4FB66F5BC614}"/>
+              </a:ext>
+            </a:extLst>
+          </p:cNvPr>
+          <p:cNvPicPr>
+            <a:picLocks noChangeAspect="1"/>
+          </p:cNvPicPr>
+          <p:nvPr/>
+        </p:nvPicPr>
+        <p:blipFill>
+          <a:blip r:embed="rId10"/>
+          <a:stretch>
+            <a:fillRect/>
+          </a:stretch>
+        </p:blipFill>
+        <p:spPr>
+          <a:xfrm rot="13173704" flipH="1" flipV="1">
+            <a:off x="2210219" y="3923420"/>
+            <a:ext cx="1616996" cy="1293596"/>
+          </a:xfrm>
+          <a:prstGeom prst="rect">
+            <a:avLst/>
+          </a:prstGeom>
+        </p:spPr>
+      </p:pic>
+      <p:pic>
+        <p:nvPicPr>
+          <p:cNvPr id="34" name="Imagem 33">
+            <a:extLst>
+              <a:ext uri="{FF2B5EF4-FFF2-40B4-BE49-F238E27FC236}">
+                <a16:creationId xmlns:a16="http://schemas.microsoft.com/office/drawing/2014/main" id="{1FF01505-D148-4F40-BB9D-13D5F9503FCB}"/>
+              </a:ext>
+            </a:extLst>
+          </p:cNvPr>
+          <p:cNvPicPr>
+            <a:picLocks noChangeAspect="1"/>
+          </p:cNvPicPr>
+          <p:nvPr/>
+        </p:nvPicPr>
+        <p:blipFill>
+          <a:blip r:embed="rId10"/>
+          <a:stretch>
+            <a:fillRect/>
+          </a:stretch>
+        </p:blipFill>
+        <p:spPr>
+          <a:xfrm rot="12554210" flipH="1" flipV="1">
+            <a:off x="5482209" y="3782555"/>
+            <a:ext cx="1524775" cy="1219819"/>
+          </a:xfrm>
+          <a:prstGeom prst="rect">
+            <a:avLst/>
+          </a:prstGeom>
+        </p:spPr>
+      </p:pic>
+    </p:spTree>
+    <p:extLst>
+      <p:ext uri="{BB962C8B-B14F-4D97-AF65-F5344CB8AC3E}">
+        <p14:creationId xmlns:p14="http://schemas.microsoft.com/office/powerpoint/2010/main" val="3099143223"/>
+      </p:ext>
+    </p:extLst>
+  </p:cSld>
+  <p:clrMapOvr>
+    <a:masterClrMapping/>
+  </p:clrMapOvr>
+</p:sld>
+</file>
+
+<file path=ppt/slides/slide4.xml><?xml version="1.0" encoding="utf-8"?>
+<p:sld xmlns:a="http://schemas.openxmlformats.org/drawingml/2006/main" xmlns:r="http://schemas.openxmlformats.org/officeDocument/2006/relationships" xmlns:p="http://schemas.openxmlformats.org/presentationml/2006/main">
+  <p:cSld>
+    <p:spTree>
+      <p:nvGrpSpPr>
         <p:cNvPr id="1" name="Shape 173"/>
         <p:cNvGrpSpPr/>
         <p:nvPr/>
@@ -27020,7 +27636,7 @@
 </p:sld>
 </file>
 
-<file path=ppt/slides/slide4.xml><?xml version="1.0" encoding="utf-8"?>
+<file path=ppt/slides/slide5.xml><?xml version="1.0" encoding="utf-8"?>
 <p:sld xmlns:a="http://schemas.openxmlformats.org/drawingml/2006/main" xmlns:r="http://schemas.openxmlformats.org/officeDocument/2006/relationships" xmlns:p="http://schemas.openxmlformats.org/presentationml/2006/main">
   <p:cSld>
     <p:spTree>
@@ -27096,7 +27712,7 @@
 </p:sld>
 </file>
 
-<file path=ppt/slides/slide5.xml><?xml version="1.0" encoding="utf-8"?>
+<file path=ppt/slides/slide6.xml><?xml version="1.0" encoding="utf-8"?>
 <p:sld xmlns:a="http://schemas.openxmlformats.org/drawingml/2006/main" xmlns:r="http://schemas.openxmlformats.org/officeDocument/2006/relationships" xmlns:p="http://schemas.openxmlformats.org/presentationml/2006/main">
   <p:cSld>
     <p:spTree>

</xml_diff>